<commit_message>
archivo balance general correcto
</commit_message>
<xml_diff>
--- a/obras/static/ppt/PRINCIPAL_BALANCE_GENERAL_APF.pptx
+++ b/obras/static/ppt/PRINCIPAL_BALANCE_GENERAL_APF.pptx
@@ -112,6 +112,36 @@
       </a:defRPr>
     </a:lvl9pPr>
   </p:defaultTextStyle>
+  <p:extLst>
+    <p:ext uri="{EFAFB233-063F-42B5-8137-9DF3F51BA10A}">
+      <p15:sldGuideLst xmlns:p15="http://schemas.microsoft.com/office/powerpoint/2012/main">
+        <p15:guide id="1" orient="horz" pos="2160">
+          <p15:clr>
+            <a:srgbClr val="A4A3A4"/>
+          </p15:clr>
+        </p15:guide>
+        <p15:guide id="2" pos="2880">
+          <p15:clr>
+            <a:srgbClr val="A4A3A4"/>
+          </p15:clr>
+        </p15:guide>
+      </p15:sldGuideLst>
+    </p:ext>
+    <p:ext uri="{2D200454-40CA-4A62-9FC3-DE9A4176ACB9}">
+      <p15:notesGuideLst xmlns:p15="http://schemas.microsoft.com/office/powerpoint/2012/main">
+        <p15:guide id="1" orient="horz" pos="2928">
+          <p15:clr>
+            <a:srgbClr val="A4A3A4"/>
+          </p15:clr>
+        </p15:guide>
+        <p15:guide id="2" pos="2208">
+          <p15:clr>
+            <a:srgbClr val="A4A3A4"/>
+          </p15:clr>
+        </p15:guide>
+      </p15:notesGuideLst>
+    </p:ext>
+  </p:extLst>
 </p:presentation>
 </file>
 
@@ -197,7 +227,7 @@
           <a:p>
             <a:fld id="{D91412EE-E23B-4E74-9CBF-E5AF10137E0E}" type="datetimeFigureOut">
               <a:rPr lang="es-MX" smtClean="0"/>
-              <a:t>10/11/2014</a:t>
+              <a:t>18/08/2015</a:t>
             </a:fld>
             <a:endParaRPr lang="es-MX"/>
           </a:p>
@@ -362,7 +392,7 @@
           <a:p>
             <a:fld id="{56612B8C-D436-442C-AF8F-F0830C8620CD}" type="datetimeFigureOut">
               <a:rPr lang="es-MX" smtClean="0"/>
-              <a:t>10/11/2014</a:t>
+              <a:t>18/08/2015</a:t>
             </a:fld>
             <a:endParaRPr lang="es-MX"/>
           </a:p>
@@ -1072,7 +1102,7 @@
           <a:p>
             <a:fld id="{46C625CF-D8F4-6941-B2C3-3F15474FDD83}" type="datetimeFigureOut">
               <a:rPr lang="es-ES" smtClean="0"/>
-              <a:t>10/11/2014</a:t>
+              <a:t>18/08/2015</a:t>
             </a:fld>
             <a:endParaRPr lang="es-ES"/>
           </a:p>
@@ -1242,7 +1272,7 @@
           <a:p>
             <a:fld id="{46C625CF-D8F4-6941-B2C3-3F15474FDD83}" type="datetimeFigureOut">
               <a:rPr lang="es-ES" smtClean="0"/>
-              <a:t>10/11/2014</a:t>
+              <a:t>18/08/2015</a:t>
             </a:fld>
             <a:endParaRPr lang="es-ES"/>
           </a:p>
@@ -1422,7 +1452,7 @@
           <a:p>
             <a:fld id="{46C625CF-D8F4-6941-B2C3-3F15474FDD83}" type="datetimeFigureOut">
               <a:rPr lang="es-ES" smtClean="0"/>
-              <a:t>10/11/2014</a:t>
+              <a:t>18/08/2015</a:t>
             </a:fld>
             <a:endParaRPr lang="es-ES"/>
           </a:p>
@@ -1592,7 +1622,7 @@
           <a:p>
             <a:fld id="{46C625CF-D8F4-6941-B2C3-3F15474FDD83}" type="datetimeFigureOut">
               <a:rPr lang="es-ES" smtClean="0"/>
-              <a:t>10/11/2014</a:t>
+              <a:t>18/08/2015</a:t>
             </a:fld>
             <a:endParaRPr lang="es-ES"/>
           </a:p>
@@ -1838,7 +1868,7 @@
           <a:p>
             <a:fld id="{46C625CF-D8F4-6941-B2C3-3F15474FDD83}" type="datetimeFigureOut">
               <a:rPr lang="es-ES" smtClean="0"/>
-              <a:t>10/11/2014</a:t>
+              <a:t>18/08/2015</a:t>
             </a:fld>
             <a:endParaRPr lang="es-ES"/>
           </a:p>
@@ -2126,7 +2156,7 @@
           <a:p>
             <a:fld id="{46C625CF-D8F4-6941-B2C3-3F15474FDD83}" type="datetimeFigureOut">
               <a:rPr lang="es-ES" smtClean="0"/>
-              <a:t>10/11/2014</a:t>
+              <a:t>18/08/2015</a:t>
             </a:fld>
             <a:endParaRPr lang="es-ES"/>
           </a:p>
@@ -2548,7 +2578,7 @@
           <a:p>
             <a:fld id="{46C625CF-D8F4-6941-B2C3-3F15474FDD83}" type="datetimeFigureOut">
               <a:rPr lang="es-ES" smtClean="0"/>
-              <a:t>10/11/2014</a:t>
+              <a:t>18/08/2015</a:t>
             </a:fld>
             <a:endParaRPr lang="es-ES"/>
           </a:p>
@@ -2666,7 +2696,7 @@
           <a:p>
             <a:fld id="{46C625CF-D8F4-6941-B2C3-3F15474FDD83}" type="datetimeFigureOut">
               <a:rPr lang="es-ES" smtClean="0"/>
-              <a:t>10/11/2014</a:t>
+              <a:t>18/08/2015</a:t>
             </a:fld>
             <a:endParaRPr lang="es-ES"/>
           </a:p>
@@ -2761,7 +2791,7 @@
           <a:p>
             <a:fld id="{46C625CF-D8F4-6941-B2C3-3F15474FDD83}" type="datetimeFigureOut">
               <a:rPr lang="es-ES" smtClean="0"/>
-              <a:t>10/11/2014</a:t>
+              <a:t>18/08/2015</a:t>
             </a:fld>
             <a:endParaRPr lang="es-ES"/>
           </a:p>
@@ -3045,7 +3075,7 @@
           <a:p>
             <a:fld id="{46C625CF-D8F4-6941-B2C3-3F15474FDD83}" type="datetimeFigureOut">
               <a:rPr lang="es-ES" smtClean="0"/>
-              <a:t>10/11/2014</a:t>
+              <a:t>18/08/2015</a:t>
             </a:fld>
             <a:endParaRPr lang="es-ES"/>
           </a:p>
@@ -3298,7 +3328,7 @@
           <a:p>
             <a:fld id="{46C625CF-D8F4-6941-B2C3-3F15474FDD83}" type="datetimeFigureOut">
               <a:rPr lang="es-ES" smtClean="0"/>
-              <a:t>10/11/2014</a:t>
+              <a:t>18/08/2015</a:t>
             </a:fld>
             <a:endParaRPr lang="es-ES"/>
           </a:p>
@@ -3517,7 +3547,7 @@
           <a:p>
             <a:fld id="{46C625CF-D8F4-6941-B2C3-3F15474FDD83}" type="datetimeFigureOut">
               <a:rPr lang="es-ES" smtClean="0"/>
-              <a:t>10/11/2014</a:t>
+              <a:t>18/08/2015</a:t>
             </a:fld>
             <a:endParaRPr lang="es-ES"/>
           </a:p>
@@ -4613,24 +4643,6 @@
               </a:rPr>
               <a:t>oncluidas, en proceso y proyectadas </a:t>
             </a:r>
-            <a:br>
-              <a:rPr lang="es-MX" sz="1400" dirty="0" smtClean="0">
-                <a:latin typeface="Arial Narrow" panose="020B0606020202030204" pitchFamily="34" charset="0"/>
-                <a:ea typeface="Calibri"/>
-                <a:cs typeface="Times New Roman"/>
-              </a:rPr>
-            </a:br>
-            <a:r>
-              <a:rPr lang="es-MX" sz="1200" dirty="0" smtClean="0">
-                <a:solidFill>
-                  <a:srgbClr val="FF0000"/>
-                </a:solidFill>
-                <a:latin typeface="Arial Narrow" panose="020B0606020202030204" pitchFamily="34" charset="0"/>
-                <a:ea typeface="Calibri"/>
-                <a:cs typeface="Times New Roman"/>
-              </a:rPr>
-              <a:t>reportadas por las Dependencias y Entidades de la Administración Pública Federal</a:t>
-            </a:r>
             <a:endParaRPr lang="es-MX" sz="1200" dirty="0">
               <a:solidFill>
                 <a:srgbClr val="FF0000"/>
@@ -4651,14 +4663,14 @@
           <p:nvPr>
             <p:extLst>
               <p:ext uri="{D42A27DB-BD31-4B8C-83A1-F6EECF244321}">
-                <p14:modId xmlns:p14="http://schemas.microsoft.com/office/powerpoint/2010/main" val="336801922"/>
+                <p14:modId xmlns:p14="http://schemas.microsoft.com/office/powerpoint/2010/main" val="3609789018"/>
               </p:ext>
             </p:extLst>
           </p:nvPr>
         </p:nvGraphicFramePr>
         <p:xfrm>
           <a:off x="1485014" y="2336224"/>
-          <a:ext cx="6096000" cy="2499463"/>
+          <a:ext cx="6096000" cy="2110749"/>
         </p:xfrm>
         <a:graphic>
           <a:graphicData uri="http://schemas.openxmlformats.org/drawingml/2006/table">
@@ -4874,7 +4886,7 @@
                     <a:lstStyle/>
                     <a:p>
                       <a:r>
-                        <a:rPr lang="es-MX" sz="1400" dirty="0" smtClean="0">
+                        <a:rPr lang="es-MX" sz="1400" b="1" dirty="0" smtClean="0">
                           <a:solidFill>
                             <a:schemeClr val="tx1">
                               <a:lumMod val="65000"/>
@@ -4885,30 +4897,15 @@
                         </a:rPr>
                         <a:t>Concluidas</a:t>
                       </a:r>
-                      <a:r>
-                        <a:rPr lang="es-MX" sz="1400" baseline="0" dirty="0" smtClean="0">
-                          <a:solidFill>
-                            <a:schemeClr val="tx1">
-                              <a:lumMod val="65000"/>
-                              <a:lumOff val="35000"/>
-                            </a:schemeClr>
-                          </a:solidFill>
-                          <a:latin typeface="Arial Narrow" panose="020B0606020202030204" pitchFamily="34" charset="0"/>
-                        </a:rPr>
-                        <a:t> </a:t>
-                      </a:r>
-                      <a:r>
-                        <a:rPr lang="es-MX" sz="1400" b="1" baseline="0" dirty="0" smtClean="0">
-                          <a:solidFill>
-                            <a:schemeClr val="tx1">
-                              <a:lumMod val="65000"/>
-                              <a:lumOff val="35000"/>
-                            </a:schemeClr>
-                          </a:solidFill>
-                          <a:latin typeface="Arial Narrow" panose="020B0606020202030204" pitchFamily="34" charset="0"/>
-                        </a:rPr>
-                        <a:t>2013</a:t>
-                      </a:r>
+                      <a:endParaRPr lang="es-MX" sz="1400" b="1" baseline="0" dirty="0" smtClean="0">
+                        <a:solidFill>
+                          <a:schemeClr val="tx1">
+                            <a:lumMod val="65000"/>
+                            <a:lumOff val="35000"/>
+                          </a:schemeClr>
+                        </a:solidFill>
+                        <a:latin typeface="Arial Narrow" panose="020B0606020202030204" pitchFamily="34" charset="0"/>
+                      </a:endParaRPr>
                     </a:p>
                   </a:txBody>
                   <a:tcPr anchor="ctr">
@@ -5108,14 +5105,14 @@
                   </a:tcPr>
                 </a:tc>
               </a:tr>
-              <a:tr h="388714">
+              <a:tr h="465977">
                 <a:tc>
                   <a:txBody>
                     <a:bodyPr/>
                     <a:lstStyle/>
                     <a:p>
                       <a:r>
-                        <a:rPr lang="es-MX" sz="1400" dirty="0" smtClean="0">
+                        <a:rPr lang="es-MX" sz="1400" b="1" dirty="0" smtClean="0">
                           <a:solidFill>
                             <a:schemeClr val="tx1">
                               <a:lumMod val="65000"/>
@@ -5124,19 +5121,7 @@
                           </a:solidFill>
                           <a:latin typeface="Arial Narrow" panose="020B0606020202030204" pitchFamily="34" charset="0"/>
                         </a:rPr>
-                        <a:t>Concluidas</a:t>
-                      </a:r>
-                      <a:r>
-                        <a:rPr lang="es-MX" sz="1400" baseline="0" dirty="0" smtClean="0">
-                          <a:solidFill>
-                            <a:schemeClr val="tx1">
-                              <a:lumMod val="65000"/>
-                              <a:lumOff val="35000"/>
-                            </a:schemeClr>
-                          </a:solidFill>
-                          <a:latin typeface="Arial Narrow" panose="020B0606020202030204" pitchFamily="34" charset="0"/>
-                        </a:rPr>
-                        <a:t> </a:t>
+                        <a:t>En</a:t>
                       </a:r>
                       <a:r>
                         <a:rPr lang="es-MX" sz="1400" b="1" baseline="0" dirty="0" smtClean="0">
@@ -5148,8 +5133,17 @@
                           </a:solidFill>
                           <a:latin typeface="Arial Narrow" panose="020B0606020202030204" pitchFamily="34" charset="0"/>
                         </a:rPr>
-                        <a:t>2014</a:t>
+                        <a:t> Proceso</a:t>
                       </a:r>
+                      <a:endParaRPr lang="es-MX" sz="1400" b="1" dirty="0">
+                        <a:solidFill>
+                          <a:schemeClr val="tx1">
+                            <a:lumMod val="65000"/>
+                            <a:lumOff val="35000"/>
+                          </a:schemeClr>
+                        </a:solidFill>
+                        <a:latin typeface="Arial Narrow" panose="020B0606020202030204" pitchFamily="34" charset="0"/>
+                      </a:endParaRPr>
                     </a:p>
                   </a:txBody>
                   <a:tcPr anchor="ctr">
@@ -5357,252 +5351,6 @@
                   </a:tcPr>
                 </a:tc>
               </a:tr>
-              <a:tr h="465977">
-                <a:tc>
-                  <a:txBody>
-                    <a:bodyPr/>
-                    <a:lstStyle/>
-                    <a:p>
-                      <a:r>
-                        <a:rPr lang="es-MX" sz="1400" b="0" dirty="0" smtClean="0">
-                          <a:solidFill>
-                            <a:schemeClr val="tx1">
-                              <a:lumMod val="65000"/>
-                              <a:lumOff val="35000"/>
-                            </a:schemeClr>
-                          </a:solidFill>
-                          <a:latin typeface="Arial Narrow" panose="020B0606020202030204" pitchFamily="34" charset="0"/>
-                        </a:rPr>
-                        <a:t>En</a:t>
-                      </a:r>
-                      <a:r>
-                        <a:rPr lang="es-MX" sz="1400" b="0" baseline="0" dirty="0" smtClean="0">
-                          <a:solidFill>
-                            <a:schemeClr val="tx1">
-                              <a:lumMod val="65000"/>
-                              <a:lumOff val="35000"/>
-                            </a:schemeClr>
-                          </a:solidFill>
-                          <a:latin typeface="Arial Narrow" panose="020B0606020202030204" pitchFamily="34" charset="0"/>
-                        </a:rPr>
-                        <a:t> Proceso</a:t>
-                      </a:r>
-                      <a:endParaRPr lang="es-MX" sz="1400" b="0" dirty="0">
-                        <a:solidFill>
-                          <a:schemeClr val="tx1">
-                            <a:lumMod val="65000"/>
-                            <a:lumOff val="35000"/>
-                          </a:schemeClr>
-                        </a:solidFill>
-                        <a:latin typeface="Arial Narrow" panose="020B0606020202030204" pitchFamily="34" charset="0"/>
-                      </a:endParaRPr>
-                    </a:p>
-                  </a:txBody>
-                  <a:tcPr anchor="ctr">
-                    <a:lnL>
-                      <a:noFill/>
-                    </a:lnL>
-                    <a:lnR w="38100" cap="flat" cmpd="sng" algn="ctr">
-                      <a:solidFill>
-                        <a:schemeClr val="bg1"/>
-                      </a:solidFill>
-                      <a:prstDash val="solid"/>
-                      <a:round/>
-                      <a:headEnd type="none" w="med" len="med"/>
-                      <a:tailEnd type="none" w="med" len="med"/>
-                    </a:lnR>
-                    <a:lnT w="6350" cap="flat" cmpd="sng" algn="ctr">
-                      <a:solidFill>
-                        <a:schemeClr val="bg1">
-                          <a:lumMod val="75000"/>
-                        </a:schemeClr>
-                      </a:solidFill>
-                      <a:prstDash val="solid"/>
-                      <a:round/>
-                      <a:headEnd type="none" w="med" len="med"/>
-                      <a:tailEnd type="none" w="med" len="med"/>
-                    </a:lnT>
-                    <a:lnB w="6350" cap="flat" cmpd="sng" algn="ctr">
-                      <a:solidFill>
-                        <a:schemeClr val="bg1">
-                          <a:lumMod val="75000"/>
-                        </a:schemeClr>
-                      </a:solidFill>
-                      <a:prstDash val="solid"/>
-                      <a:round/>
-                      <a:headEnd type="none" w="med" len="med"/>
-                      <a:tailEnd type="none" w="med" len="med"/>
-                    </a:lnB>
-                    <a:lnTlToBr w="12700" cmpd="sng">
-                      <a:noFill/>
-                      <a:prstDash val="solid"/>
-                    </a:lnTlToBr>
-                    <a:lnBlToTr w="12700" cmpd="sng">
-                      <a:noFill/>
-                      <a:prstDash val="solid"/>
-                    </a:lnBlToTr>
-                    <a:noFill/>
-                  </a:tcPr>
-                </a:tc>
-                <a:tc>
-                  <a:txBody>
-                    <a:bodyPr/>
-                    <a:lstStyle/>
-                    <a:p>
-                      <a:pPr algn="ctr"/>
-                      <a:endParaRPr lang="es-MX" sz="1400" dirty="0">
-                        <a:solidFill>
-                          <a:schemeClr val="tx1">
-                            <a:lumMod val="65000"/>
-                            <a:lumOff val="35000"/>
-                          </a:schemeClr>
-                        </a:solidFill>
-                        <a:latin typeface="Arial Narrow" panose="020B0606020202030204" pitchFamily="34" charset="0"/>
-                      </a:endParaRPr>
-                    </a:p>
-                  </a:txBody>
-                  <a:tcPr anchor="ctr">
-                    <a:lnL w="38100" cap="flat" cmpd="sng" algn="ctr">
-                      <a:solidFill>
-                        <a:schemeClr val="bg1"/>
-                      </a:solidFill>
-                      <a:prstDash val="solid"/>
-                      <a:round/>
-                      <a:headEnd type="none" w="med" len="med"/>
-                      <a:tailEnd type="none" w="med" len="med"/>
-                    </a:lnL>
-                    <a:lnR w="38100" cap="flat" cmpd="sng" algn="ctr">
-                      <a:solidFill>
-                        <a:schemeClr val="bg1"/>
-                      </a:solidFill>
-                      <a:prstDash val="solid"/>
-                      <a:round/>
-                      <a:headEnd type="none" w="med" len="med"/>
-                      <a:tailEnd type="none" w="med" len="med"/>
-                    </a:lnR>
-                    <a:lnT w="6350" cap="flat" cmpd="sng" algn="ctr">
-                      <a:solidFill>
-                        <a:schemeClr val="bg1">
-                          <a:lumMod val="75000"/>
-                        </a:schemeClr>
-                      </a:solidFill>
-                      <a:prstDash val="solid"/>
-                      <a:round/>
-                      <a:headEnd type="none" w="med" len="med"/>
-                      <a:tailEnd type="none" w="med" len="med"/>
-                    </a:lnT>
-                    <a:lnB w="6350" cap="flat" cmpd="sng" algn="ctr">
-                      <a:solidFill>
-                        <a:schemeClr val="bg1">
-                          <a:lumMod val="75000"/>
-                        </a:schemeClr>
-                      </a:solidFill>
-                      <a:prstDash val="solid"/>
-                      <a:round/>
-                      <a:headEnd type="none" w="med" len="med"/>
-                      <a:tailEnd type="none" w="med" len="med"/>
-                    </a:lnB>
-                    <a:lnTlToBr w="12700" cmpd="sng">
-                      <a:noFill/>
-                      <a:prstDash val="solid"/>
-                    </a:lnTlToBr>
-                    <a:lnBlToTr w="12700" cmpd="sng">
-                      <a:noFill/>
-                      <a:prstDash val="solid"/>
-                    </a:lnBlToTr>
-                    <a:solidFill>
-                      <a:schemeClr val="bg1">
-                        <a:lumMod val="95000"/>
-                      </a:schemeClr>
-                    </a:solidFill>
-                  </a:tcPr>
-                </a:tc>
-                <a:tc>
-                  <a:txBody>
-                    <a:bodyPr/>
-                    <a:lstStyle/>
-                    <a:p>
-                      <a:pPr marL="0" marR="0" indent="0" algn="ctr" defTabSz="457200" rtl="0" eaLnBrk="1" fontAlgn="auto" latinLnBrk="0" hangingPunct="1">
-                        <a:lnSpc>
-                          <a:spcPct val="100000"/>
-                        </a:lnSpc>
-                        <a:spcBef>
-                          <a:spcPts val="0"/>
-                        </a:spcBef>
-                        <a:spcAft>
-                          <a:spcPts val="0"/>
-                        </a:spcAft>
-                        <a:buClrTx/>
-                        <a:buSzTx/>
-                        <a:buFontTx/>
-                        <a:buNone/>
-                        <a:tabLst/>
-                        <a:defRPr/>
-                      </a:pPr>
-                      <a:endParaRPr lang="es-MX" sz="1400" kern="1200" dirty="0">
-                        <a:solidFill>
-                          <a:schemeClr val="tx1">
-                            <a:lumMod val="65000"/>
-                            <a:lumOff val="35000"/>
-                          </a:schemeClr>
-                        </a:solidFill>
-                        <a:latin typeface="Arial Narrow" panose="020B0606020202030204" pitchFamily="34" charset="0"/>
-                        <a:ea typeface="+mn-ea"/>
-                        <a:cs typeface="+mn-cs"/>
-                      </a:endParaRPr>
-                    </a:p>
-                  </a:txBody>
-                  <a:tcPr marL="9525" marR="9525" marT="9525" marB="0" anchor="ctr">
-                    <a:lnL w="38100" cap="flat" cmpd="sng" algn="ctr">
-                      <a:solidFill>
-                        <a:schemeClr val="bg1"/>
-                      </a:solidFill>
-                      <a:prstDash val="solid"/>
-                      <a:round/>
-                      <a:headEnd type="none" w="med" len="med"/>
-                      <a:tailEnd type="none" w="med" len="med"/>
-                    </a:lnL>
-                    <a:lnR w="6350" cap="flat" cmpd="sng" algn="ctr">
-                      <a:noFill/>
-                      <a:prstDash val="solid"/>
-                      <a:round/>
-                      <a:headEnd type="none" w="med" len="med"/>
-                      <a:tailEnd type="none" w="med" len="med"/>
-                    </a:lnR>
-                    <a:lnT w="6350" cap="flat" cmpd="sng" algn="ctr">
-                      <a:solidFill>
-                        <a:schemeClr val="bg1">
-                          <a:lumMod val="75000"/>
-                        </a:schemeClr>
-                      </a:solidFill>
-                      <a:prstDash val="solid"/>
-                      <a:round/>
-                      <a:headEnd type="none" w="med" len="med"/>
-                      <a:tailEnd type="none" w="med" len="med"/>
-                    </a:lnT>
-                    <a:lnB w="6350" cap="flat" cmpd="sng" algn="ctr">
-                      <a:solidFill>
-                        <a:schemeClr val="bg1">
-                          <a:lumMod val="75000"/>
-                        </a:schemeClr>
-                      </a:solidFill>
-                      <a:prstDash val="solid"/>
-                      <a:round/>
-                      <a:headEnd type="none" w="med" len="med"/>
-                      <a:tailEnd type="none" w="med" len="med"/>
-                    </a:lnB>
-                    <a:lnTlToBr w="12700" cmpd="sng">
-                      <a:noFill/>
-                      <a:prstDash val="solid"/>
-                    </a:lnTlToBr>
-                    <a:lnBlToTr w="12700" cmpd="sng">
-                      <a:noFill/>
-                      <a:prstDash val="solid"/>
-                    </a:lnBlToTr>
-                    <a:noFill/>
-                  </a:tcPr>
-                </a:tc>
-              </a:tr>
               <a:tr h="489097">
                 <a:tc>
                   <a:txBody>
@@ -5610,7 +5358,7 @@
                     <a:lstStyle/>
                     <a:p>
                       <a:r>
-                        <a:rPr lang="es-MX" sz="1400" b="0" dirty="0" smtClean="0">
+                        <a:rPr lang="es-MX" sz="1400" b="1" dirty="0" smtClean="0">
                           <a:solidFill>
                             <a:schemeClr val="tx1">
                               <a:lumMod val="65000"/>
@@ -5621,7 +5369,7 @@
                         </a:rPr>
                         <a:t>Proyectadas</a:t>
                       </a:r>
-                      <a:endParaRPr lang="es-MX" sz="1400" b="0" dirty="0">
+                      <a:endParaRPr lang="es-MX" sz="1400" b="1" dirty="0">
                         <a:solidFill>
                           <a:schemeClr val="tx1">
                             <a:lumMod val="65000"/>
@@ -6572,82 +6320,6 @@
         <p:spPr>
           <a:xfrm>
             <a:off x="5575000" y="3027320"/>
-            <a:ext cx="2006013" cy="307777"/>
-          </a:xfrm>
-          <a:prstGeom prst="rect">
-            <a:avLst/>
-          </a:prstGeom>
-          <a:noFill/>
-        </p:spPr>
-        <p:txBody>
-          <a:bodyPr wrap="square" rtlCol="0">
-            <a:spAutoFit/>
-          </a:bodyPr>
-          <a:lstStyle/>
-          <a:p>
-            <a:pPr algn="ctr"/>
-            <a:r>
-              <a:rPr lang="es-MX" sz="1400" dirty="0" smtClean="0">
-                <a:latin typeface="Arial Narrow" panose="020B0606020202030204" pitchFamily="34" charset="0"/>
-              </a:rPr>
-              <a:t>I</a:t>
-            </a:r>
-            <a:endParaRPr lang="es-MX" sz="1400" dirty="0">
-              <a:latin typeface="Arial Narrow" panose="020B0606020202030204" pitchFamily="34" charset="0"/>
-            </a:endParaRPr>
-          </a:p>
-        </p:txBody>
-      </p:sp>
-      <p:sp>
-        <p:nvSpPr>
-          <p:cNvPr id="15" name="14 CuadroTexto"/>
-          <p:cNvSpPr txBox="1"/>
-          <p:nvPr/>
-        </p:nvSpPr>
-        <p:spPr>
-          <a:xfrm>
-            <a:off x="3763927" y="4473676"/>
-            <a:ext cx="1722473" cy="307777"/>
-          </a:xfrm>
-          <a:prstGeom prst="rect">
-            <a:avLst/>
-          </a:prstGeom>
-          <a:noFill/>
-        </p:spPr>
-        <p:txBody>
-          <a:bodyPr wrap="square" rtlCol="0">
-            <a:spAutoFit/>
-          </a:bodyPr>
-          <a:lstStyle/>
-          <a:p>
-            <a:pPr algn="ctr"/>
-            <a:r>
-              <a:rPr lang="es-MX" sz="1400" dirty="0" smtClean="0">
-                <a:solidFill>
-                  <a:srgbClr val="008040"/>
-                </a:solidFill>
-                <a:latin typeface="Arial Narrow" panose="020B0606020202030204" pitchFamily="34" charset="0"/>
-              </a:rPr>
-              <a:t>I</a:t>
-            </a:r>
-            <a:endParaRPr lang="es-MX" sz="1400" dirty="0">
-              <a:solidFill>
-                <a:srgbClr val="008040"/>
-              </a:solidFill>
-              <a:latin typeface="Arial Narrow" panose="020B0606020202030204" pitchFamily="34" charset="0"/>
-            </a:endParaRPr>
-          </a:p>
-        </p:txBody>
-      </p:sp>
-      <p:sp>
-        <p:nvSpPr>
-          <p:cNvPr id="17" name="16 CuadroTexto"/>
-          <p:cNvSpPr txBox="1"/>
-          <p:nvPr/>
-        </p:nvSpPr>
-        <p:spPr>
-          <a:xfrm>
-            <a:off x="5575000" y="4478442"/>
             <a:ext cx="2006013" cy="307777"/>
           </a:xfrm>
           <a:prstGeom prst="rect">

</xml_diff>